<commit_message>
final [maybe ;P ]
</commit_message>
<xml_diff>
--- a/New Git Concepts.pptx
+++ b/New Git Concepts.pptx
@@ -8826,6 +8826,366 @@
           <a:chExt cx="0" cy="0"/>
         </a:xfrm>
       </p:grpSpPr>
+      <p:sp>
+        <p:nvSpPr>
+          <p:cNvPr id="10" name="Flowchart: Data 9">
+            <a:extLst>
+              <a:ext uri="{FF2B5EF4-FFF2-40B4-BE49-F238E27FC236}">
+                <a16:creationId xmlns:a16="http://schemas.microsoft.com/office/drawing/2014/main" id="{9C57ED89-09FA-819C-088F-865148EACC12}"/>
+              </a:ext>
+            </a:extLst>
+          </p:cNvPr>
+          <p:cNvSpPr/>
+          <p:nvPr/>
+        </p:nvSpPr>
+        <p:spPr>
+          <a:xfrm>
+            <a:off x="2423592" y="188640"/>
+            <a:ext cx="9552384" cy="5328592"/>
+          </a:xfrm>
+          <a:prstGeom prst="flowChartInputOutput">
+            <a:avLst/>
+          </a:prstGeom>
+          <a:solidFill>
+            <a:schemeClr val="accent1">
+              <a:alpha val="53000"/>
+            </a:schemeClr>
+          </a:solidFill>
+        </p:spPr>
+        <p:style>
+          <a:lnRef idx="2">
+            <a:schemeClr val="accent1">
+              <a:shade val="50000"/>
+            </a:schemeClr>
+          </a:lnRef>
+          <a:fillRef idx="1">
+            <a:schemeClr val="accent1"/>
+          </a:fillRef>
+          <a:effectRef idx="0">
+            <a:schemeClr val="accent1"/>
+          </a:effectRef>
+          <a:fontRef idx="minor">
+            <a:schemeClr val="lt1"/>
+          </a:fontRef>
+        </p:style>
+        <p:txBody>
+          <a:bodyPr rtlCol="0" anchor="ctr"/>
+          <a:lstStyle/>
+          <a:p>
+            <a:pPr algn="ctr"/>
+            <a:endParaRPr lang="en-IN" dirty="0"/>
+          </a:p>
+        </p:txBody>
+      </p:sp>
+      <p:sp>
+        <p:nvSpPr>
+          <p:cNvPr id="11" name="Parallelogram 10">
+            <a:extLst>
+              <a:ext uri="{FF2B5EF4-FFF2-40B4-BE49-F238E27FC236}">
+                <a16:creationId xmlns:a16="http://schemas.microsoft.com/office/drawing/2014/main" id="{17827D18-5649-B828-D824-D535290705DE}"/>
+              </a:ext>
+            </a:extLst>
+          </p:cNvPr>
+          <p:cNvSpPr/>
+          <p:nvPr/>
+        </p:nvSpPr>
+        <p:spPr>
+          <a:xfrm>
+            <a:off x="839416" y="476672"/>
+            <a:ext cx="5472608" cy="4104456"/>
+          </a:xfrm>
+          <a:prstGeom prst="parallelogram">
+            <a:avLst/>
+          </a:prstGeom>
+          <a:solidFill>
+            <a:schemeClr val="accent1">
+              <a:alpha val="76000"/>
+            </a:schemeClr>
+          </a:solidFill>
+        </p:spPr>
+        <p:style>
+          <a:lnRef idx="2">
+            <a:schemeClr val="accent1">
+              <a:shade val="50000"/>
+            </a:schemeClr>
+          </a:lnRef>
+          <a:fillRef idx="1">
+            <a:schemeClr val="accent1"/>
+          </a:fillRef>
+          <a:effectRef idx="0">
+            <a:schemeClr val="accent1"/>
+          </a:effectRef>
+          <a:fontRef idx="minor">
+            <a:schemeClr val="lt1"/>
+          </a:fontRef>
+        </p:style>
+        <p:txBody>
+          <a:bodyPr rtlCol="0" anchor="ctr"/>
+          <a:lstStyle/>
+          <a:p>
+            <a:pPr algn="ctr"/>
+            <a:endParaRPr lang="en-IN"/>
+          </a:p>
+        </p:txBody>
+      </p:sp>
+      <p:sp>
+        <p:nvSpPr>
+          <p:cNvPr id="12" name="Rectangle 11">
+            <a:extLst>
+              <a:ext uri="{FF2B5EF4-FFF2-40B4-BE49-F238E27FC236}">
+                <a16:creationId xmlns:a16="http://schemas.microsoft.com/office/drawing/2014/main" id="{7F90483D-87B1-FEAF-49A0-B76836CCE205}"/>
+              </a:ext>
+            </a:extLst>
+          </p:cNvPr>
+          <p:cNvSpPr/>
+          <p:nvPr/>
+        </p:nvSpPr>
+        <p:spPr>
+          <a:xfrm>
+            <a:off x="0" y="0"/>
+            <a:ext cx="12192000" cy="1340768"/>
+          </a:xfrm>
+          <a:prstGeom prst="rect">
+            <a:avLst/>
+          </a:prstGeom>
+          <a:solidFill>
+            <a:schemeClr val="accent1">
+              <a:alpha val="0"/>
+            </a:schemeClr>
+          </a:solidFill>
+        </p:spPr>
+        <p:style>
+          <a:lnRef idx="2">
+            <a:schemeClr val="accent1">
+              <a:shade val="50000"/>
+            </a:schemeClr>
+          </a:lnRef>
+          <a:fillRef idx="1">
+            <a:schemeClr val="accent1"/>
+          </a:fillRef>
+          <a:effectRef idx="0">
+            <a:schemeClr val="accent1"/>
+          </a:effectRef>
+          <a:fontRef idx="minor">
+            <a:schemeClr val="lt1"/>
+          </a:fontRef>
+        </p:style>
+        <p:txBody>
+          <a:bodyPr rtlCol="0" anchor="ctr"/>
+          <a:lstStyle/>
+          <a:p>
+            <a:pPr algn="ctr"/>
+            <a:r>
+              <a:rPr lang="en-IN" sz="2800" dirty="0"/>
+              <a:t>Git rebase can also be used to squash two or more commits into one</a:t>
+            </a:r>
+            <a:br>
+              <a:rPr lang="en-IN" sz="2800" dirty="0"/>
+            </a:br>
+            <a:r>
+              <a:rPr lang="en-IN" sz="2800" dirty="0"/>
+              <a:t>as well to rename a commit </a:t>
+            </a:r>
+          </a:p>
+        </p:txBody>
+      </p:sp>
+      <p:pic>
+        <p:nvPicPr>
+          <p:cNvPr id="13" name="Picture 12">
+            <a:extLst>
+              <a:ext uri="{FF2B5EF4-FFF2-40B4-BE49-F238E27FC236}">
+                <a16:creationId xmlns:a16="http://schemas.microsoft.com/office/drawing/2014/main" id="{B1BCCA35-92A7-B853-BAA4-3C723F30B228}"/>
+              </a:ext>
+            </a:extLst>
+          </p:cNvPr>
+          <p:cNvPicPr>
+            <a:picLocks noChangeAspect="1"/>
+          </p:cNvPicPr>
+          <p:nvPr/>
+        </p:nvPicPr>
+        <p:blipFill rotWithShape="1">
+          <a:blip r:embed="rId2"/>
+          <a:srcRect b="64761"/>
+          <a:stretch/>
+        </p:blipFill>
+        <p:spPr>
+          <a:xfrm>
+            <a:off x="0" y="1340768"/>
+            <a:ext cx="5879976" cy="1944216"/>
+          </a:xfrm>
+          <a:prstGeom prst="rect">
+            <a:avLst/>
+          </a:prstGeom>
+        </p:spPr>
+      </p:pic>
+      <p:pic>
+        <p:nvPicPr>
+          <p:cNvPr id="2050" name="Picture 2">
+            <a:extLst>
+              <a:ext uri="{FF2B5EF4-FFF2-40B4-BE49-F238E27FC236}">
+                <a16:creationId xmlns:a16="http://schemas.microsoft.com/office/drawing/2014/main" id="{15DBE46D-AB63-F05B-2BF2-50E8EC04D3A8}"/>
+              </a:ext>
+            </a:extLst>
+          </p:cNvPr>
+          <p:cNvPicPr>
+            <a:picLocks noChangeAspect="1" noChangeArrowheads="1"/>
+          </p:cNvPicPr>
+          <p:nvPr/>
+        </p:nvPicPr>
+        <p:blipFill>
+          <a:blip r:embed="rId3">
+            <a:extLst>
+              <a:ext uri="{28A0092B-C50C-407E-A947-70E740481C1C}">
+                <a14:useLocalDpi xmlns:a14="http://schemas.microsoft.com/office/drawing/2010/main" val="0"/>
+              </a:ext>
+            </a:extLst>
+          </a:blip>
+          <a:srcRect/>
+          <a:stretch>
+            <a:fillRect/>
+          </a:stretch>
+        </p:blipFill>
+        <p:spPr bwMode="auto">
+          <a:xfrm>
+            <a:off x="5879976" y="2922672"/>
+            <a:ext cx="5750049" cy="2952328"/>
+          </a:xfrm>
+          <a:prstGeom prst="rect">
+            <a:avLst/>
+          </a:prstGeom>
+          <a:noFill/>
+          <a:extLst>
+            <a:ext uri="{909E8E84-426E-40DD-AFC4-6F175D3DCCD1}">
+              <a14:hiddenFill xmlns:a14="http://schemas.microsoft.com/office/drawing/2010/main">
+                <a:solidFill>
+                  <a:srgbClr val="FFFFFF"/>
+                </a:solidFill>
+              </a14:hiddenFill>
+            </a:ext>
+          </a:extLst>
+        </p:spPr>
+      </p:pic>
+      <p:sp>
+        <p:nvSpPr>
+          <p:cNvPr id="14" name="Rectangle 13">
+            <a:extLst>
+              <a:ext uri="{FF2B5EF4-FFF2-40B4-BE49-F238E27FC236}">
+                <a16:creationId xmlns:a16="http://schemas.microsoft.com/office/drawing/2014/main" id="{D34FED7C-29C3-1271-0CB2-E346FE32FE2C}"/>
+              </a:ext>
+            </a:extLst>
+          </p:cNvPr>
+          <p:cNvSpPr/>
+          <p:nvPr/>
+        </p:nvSpPr>
+        <p:spPr>
+          <a:xfrm>
+            <a:off x="5879976" y="1340768"/>
+            <a:ext cx="6312024" cy="1512168"/>
+          </a:xfrm>
+          <a:prstGeom prst="rect">
+            <a:avLst/>
+          </a:prstGeom>
+          <a:solidFill>
+            <a:schemeClr val="accent1">
+              <a:alpha val="0"/>
+            </a:schemeClr>
+          </a:solidFill>
+          <a:ln>
+            <a:noFill/>
+          </a:ln>
+        </p:spPr>
+        <p:style>
+          <a:lnRef idx="2">
+            <a:schemeClr val="accent1">
+              <a:shade val="50000"/>
+            </a:schemeClr>
+          </a:lnRef>
+          <a:fillRef idx="1">
+            <a:schemeClr val="accent1"/>
+          </a:fillRef>
+          <a:effectRef idx="0">
+            <a:schemeClr val="accent1"/>
+          </a:effectRef>
+          <a:fontRef idx="minor">
+            <a:schemeClr val="lt1"/>
+          </a:fontRef>
+        </p:style>
+        <p:txBody>
+          <a:bodyPr rtlCol="0" anchor="ctr"/>
+          <a:lstStyle/>
+          <a:p>
+            <a:pPr algn="ctr"/>
+            <a:r>
+              <a:rPr lang="en-IN" sz="3200" dirty="0"/>
+              <a:t>This will squash the commits B,C,D into a single commit i.e. A</a:t>
+            </a:r>
+          </a:p>
+        </p:txBody>
+      </p:sp>
+      <p:pic>
+        <p:nvPicPr>
+          <p:cNvPr id="15" name="Picture 14">
+            <a:extLst>
+              <a:ext uri="{FF2B5EF4-FFF2-40B4-BE49-F238E27FC236}">
+                <a16:creationId xmlns:a16="http://schemas.microsoft.com/office/drawing/2014/main" id="{C8877683-D5EB-5D5E-A91C-2800A73B9CFA}"/>
+              </a:ext>
+            </a:extLst>
+          </p:cNvPr>
+          <p:cNvPicPr>
+            <a:picLocks noChangeAspect="1"/>
+          </p:cNvPicPr>
+          <p:nvPr/>
+        </p:nvPicPr>
+        <p:blipFill rotWithShape="1">
+          <a:blip r:embed="rId4"/>
+          <a:srcRect l="10878" t="14634"/>
+          <a:stretch/>
+        </p:blipFill>
+        <p:spPr>
+          <a:xfrm>
+            <a:off x="28600" y="4398836"/>
+            <a:ext cx="5219600" cy="2520280"/>
+          </a:xfrm>
+          <a:prstGeom prst="rect">
+            <a:avLst/>
+          </a:prstGeom>
+        </p:spPr>
+      </p:pic>
+      <p:sp>
+        <p:nvSpPr>
+          <p:cNvPr id="16" name="TextBox 15">
+            <a:extLst>
+              <a:ext uri="{FF2B5EF4-FFF2-40B4-BE49-F238E27FC236}">
+                <a16:creationId xmlns:a16="http://schemas.microsoft.com/office/drawing/2014/main" id="{D8EBA979-9EFF-0A01-8A34-23BAB07338B7}"/>
+              </a:ext>
+            </a:extLst>
+          </p:cNvPr>
+          <p:cNvSpPr txBox="1"/>
+          <p:nvPr/>
+        </p:nvSpPr>
+        <p:spPr>
+          <a:xfrm>
+            <a:off x="350208" y="3321618"/>
+            <a:ext cx="5688632" cy="1077218"/>
+          </a:xfrm>
+          <a:prstGeom prst="rect">
+            <a:avLst/>
+          </a:prstGeom>
+          <a:noFill/>
+        </p:spPr>
+        <p:txBody>
+          <a:bodyPr wrap="square" rtlCol="0">
+            <a:spAutoFit/>
+          </a:bodyPr>
+          <a:lstStyle/>
+          <a:p>
+            <a:r>
+              <a:rPr lang="en-IN" sz="3200" dirty="0"/>
+              <a:t>To change the commit message we use reword</a:t>
+            </a:r>
+          </a:p>
+        </p:txBody>
+      </p:sp>
     </p:spTree>
     <p:extLst>
       <p:ext uri="{BB962C8B-B14F-4D97-AF65-F5344CB8AC3E}">
@@ -9226,6 +9586,25 @@
                   </a:solidFill>
                   <a:prstDash val="solid"/>
                 </a:ln>
+                <a:solidFill>
+                  <a:srgbClr val="000000"/>
+                </a:solidFill>
+                <a:effectLst>
+                  <a:outerShdw dist="38100" dir="2640000" algn="bl" rotWithShape="0">
+                    <a:schemeClr val="accent1"/>
+                  </a:outerShdw>
+                </a:effectLst>
+              </a:rPr>
+              <a:t>Sources</a:t>
+            </a:r>
+            <a:r>
+              <a:rPr lang="en-US" sz="5400" b="1" u="sng" dirty="0">
+                <a:ln w="12700">
+                  <a:solidFill>
+                    <a:schemeClr val="accent1"/>
+                  </a:solidFill>
+                  <a:prstDash val="solid"/>
+                </a:ln>
                 <a:pattFill prst="pct50">
                   <a:fgClr>
                     <a:schemeClr val="accent1"/>
@@ -9243,7 +9622,7 @@
                   </a:outerShdw>
                 </a:effectLst>
               </a:rPr>
-              <a:t>Sources:</a:t>
+              <a:t>:</a:t>
             </a:r>
             <a:endParaRPr lang="en-US" sz="5400" b="0" u="sng" cap="none" spc="0" dirty="0">
               <a:ln w="0"/>

</xml_diff>